<commit_message>
Added dataexploration and datatransformation files -slight update on readme
</commit_message>
<xml_diff>
--- a/Documents/project4.pptx
+++ b/Documents/project4.pptx
@@ -278,7 +278,7 @@
           <a:p>
             <a:fld id="{A9ABC68C-C7A0-45E7-94EC-22E10C0363D7}" type="datetimeFigureOut">
               <a:rPr lang="en-AU" smtClean="0"/>
-              <a:t>16/12/2022</a:t>
+              <a:t>17/12/2022</a:t>
             </a:fld>
             <a:endParaRPr lang="en-AU"/>
           </a:p>
@@ -478,7 +478,7 @@
           <a:p>
             <a:fld id="{A9ABC68C-C7A0-45E7-94EC-22E10C0363D7}" type="datetimeFigureOut">
               <a:rPr lang="en-AU" smtClean="0"/>
-              <a:t>16/12/2022</a:t>
+              <a:t>17/12/2022</a:t>
             </a:fld>
             <a:endParaRPr lang="en-AU"/>
           </a:p>
@@ -688,7 +688,7 @@
           <a:p>
             <a:fld id="{A9ABC68C-C7A0-45E7-94EC-22E10C0363D7}" type="datetimeFigureOut">
               <a:rPr lang="en-AU" smtClean="0"/>
-              <a:t>16/12/2022</a:t>
+              <a:t>17/12/2022</a:t>
             </a:fld>
             <a:endParaRPr lang="en-AU"/>
           </a:p>
@@ -888,7 +888,7 @@
           <a:p>
             <a:fld id="{A9ABC68C-C7A0-45E7-94EC-22E10C0363D7}" type="datetimeFigureOut">
               <a:rPr lang="en-AU" smtClean="0"/>
-              <a:t>16/12/2022</a:t>
+              <a:t>17/12/2022</a:t>
             </a:fld>
             <a:endParaRPr lang="en-AU"/>
           </a:p>
@@ -1164,7 +1164,7 @@
           <a:p>
             <a:fld id="{A9ABC68C-C7A0-45E7-94EC-22E10C0363D7}" type="datetimeFigureOut">
               <a:rPr lang="en-AU" smtClean="0"/>
-              <a:t>16/12/2022</a:t>
+              <a:t>17/12/2022</a:t>
             </a:fld>
             <a:endParaRPr lang="en-AU"/>
           </a:p>
@@ -1432,7 +1432,7 @@
           <a:p>
             <a:fld id="{A9ABC68C-C7A0-45E7-94EC-22E10C0363D7}" type="datetimeFigureOut">
               <a:rPr lang="en-AU" smtClean="0"/>
-              <a:t>16/12/2022</a:t>
+              <a:t>17/12/2022</a:t>
             </a:fld>
             <a:endParaRPr lang="en-AU"/>
           </a:p>
@@ -1847,7 +1847,7 @@
           <a:p>
             <a:fld id="{A9ABC68C-C7A0-45E7-94EC-22E10C0363D7}" type="datetimeFigureOut">
               <a:rPr lang="en-AU" smtClean="0"/>
-              <a:t>16/12/2022</a:t>
+              <a:t>17/12/2022</a:t>
             </a:fld>
             <a:endParaRPr lang="en-AU"/>
           </a:p>
@@ -1989,7 +1989,7 @@
           <a:p>
             <a:fld id="{A9ABC68C-C7A0-45E7-94EC-22E10C0363D7}" type="datetimeFigureOut">
               <a:rPr lang="en-AU" smtClean="0"/>
-              <a:t>16/12/2022</a:t>
+              <a:t>17/12/2022</a:t>
             </a:fld>
             <a:endParaRPr lang="en-AU"/>
           </a:p>
@@ -2102,7 +2102,7 @@
           <a:p>
             <a:fld id="{A9ABC68C-C7A0-45E7-94EC-22E10C0363D7}" type="datetimeFigureOut">
               <a:rPr lang="en-AU" smtClean="0"/>
-              <a:t>16/12/2022</a:t>
+              <a:t>17/12/2022</a:t>
             </a:fld>
             <a:endParaRPr lang="en-AU"/>
           </a:p>
@@ -2415,7 +2415,7 @@
           <a:p>
             <a:fld id="{A9ABC68C-C7A0-45E7-94EC-22E10C0363D7}" type="datetimeFigureOut">
               <a:rPr lang="en-AU" smtClean="0"/>
-              <a:t>16/12/2022</a:t>
+              <a:t>17/12/2022</a:t>
             </a:fld>
             <a:endParaRPr lang="en-AU"/>
           </a:p>
@@ -2704,7 +2704,7 @@
           <a:p>
             <a:fld id="{A9ABC68C-C7A0-45E7-94EC-22E10C0363D7}" type="datetimeFigureOut">
               <a:rPr lang="en-AU" smtClean="0"/>
-              <a:t>16/12/2022</a:t>
+              <a:t>17/12/2022</a:t>
             </a:fld>
             <a:endParaRPr lang="en-AU"/>
           </a:p>
@@ -2947,7 +2947,7 @@
           <a:p>
             <a:fld id="{A9ABC68C-C7A0-45E7-94EC-22E10C0363D7}" type="datetimeFigureOut">
               <a:rPr lang="en-AU" smtClean="0"/>
-              <a:t>16/12/2022</a:t>
+              <a:t>17/12/2022</a:t>
             </a:fld>
             <a:endParaRPr lang="en-AU"/>
           </a:p>
@@ -8076,6 +8076,16 @@
           </a:lstStyle>
           <a:p>
             <a:r>
+              <a:rPr lang="en-AU" b="0" i="0">
+                <a:solidFill>
+                  <a:srgbClr val="000000"/>
+                </a:solidFill>
+                <a:effectLst/>
+                <a:latin typeface="Consolas" panose="020B0609020204030204" pitchFamily="49" charset="0"/>
+              </a:rPr>
+              <a:t>8625 </a:t>
+            </a:r>
+            <a:r>
               <a:rPr lang="en-AU" b="0" i="0" dirty="0">
                 <a:solidFill>
                   <a:srgbClr val="000000"/>
@@ -8083,7 +8093,7 @@
                 <a:effectLst/>
                 <a:latin typeface="Consolas" panose="020B0609020204030204" pitchFamily="49" charset="0"/>
               </a:rPr>
-              <a:t>25875 total rows of data</a:t>
+              <a:t>total rows of data</a:t>
             </a:r>
             <a:endParaRPr lang="en-AU" dirty="0"/>
           </a:p>

</xml_diff>